<commit_message>
first status pres quickfix
</commit_message>
<xml_diff>
--- a/docs/WIP/Staffr_status_1.pptx
+++ b/docs/WIP/Staffr_status_1.pptx
@@ -890,7 +890,7 @@
           <a:graphicData uri="http://schemas.openxmlformats.org/presentationml/2006/ole">
             <mc:AlternateContent xmlns:mc="http://schemas.openxmlformats.org/markup-compatibility/2006">
               <mc:Choice xmlns:v="urn:schemas-microsoft-com:vml" Requires="v">
-                <p:oleObj spid="_x0000_s25687" name="think-cell Slide" r:id="rId4" imgW="270" imgH="270" progId="TCLayout.ActiveDocument.1">
+                <p:oleObj spid="_x0000_s25688" name="think-cell Slide" r:id="rId4" imgW="270" imgH="270" progId="TCLayout.ActiveDocument.1">
                   <p:embed/>
                 </p:oleObj>
               </mc:Choice>
@@ -1498,7 +1498,7 @@
           <a:graphicData uri="http://schemas.openxmlformats.org/presentationml/2006/ole">
             <mc:AlternateContent xmlns:mc="http://schemas.openxmlformats.org/markup-compatibility/2006">
               <mc:Choice xmlns:v="urn:schemas-microsoft-com:vml" Requires="v">
-                <p:oleObj spid="_x0000_s92162" name="think-cell Slide" r:id="rId4" imgW="270" imgH="270" progId="TCLayout.ActiveDocument.1">
+                <p:oleObj spid="_x0000_s92163" name="think-cell Slide" r:id="rId4" imgW="270" imgH="270" progId="TCLayout.ActiveDocument.1">
                   <p:embed/>
                 </p:oleObj>
               </mc:Choice>
@@ -1704,7 +1704,7 @@
           <a:graphicData uri="http://schemas.openxmlformats.org/presentationml/2006/ole">
             <mc:AlternateContent xmlns:mc="http://schemas.openxmlformats.org/markup-compatibility/2006">
               <mc:Choice xmlns:v="urn:schemas-microsoft-com:vml" Requires="v">
-                <p:oleObj spid="_x0000_s1185" name="think-cell Slide" r:id="rId10" imgW="270" imgH="270" progId="TCLayout.ActiveDocument.1">
+                <p:oleObj spid="_x0000_s1186" name="think-cell Slide" r:id="rId10" imgW="270" imgH="270" progId="TCLayout.ActiveDocument.1">
                   <p:embed/>
                 </p:oleObj>
               </mc:Choice>
@@ -2330,10 +2330,6 @@
               <a:rPr lang="en-US" sz="4400" dirty="0" smtClean="0"/>
               <a:t>:</a:t>
             </a:r>
-            <a:r>
-              <a:rPr lang="en-US" sz="4400" dirty="0" smtClean="0"/>
-              <a:t/>
-            </a:r>
             <a:br>
               <a:rPr lang="en-US" sz="4400" dirty="0" smtClean="0"/>
             </a:br>
@@ -2374,11 +2370,7 @@
             </a:r>
             <a:r>
               <a:rPr lang="cs-CZ" dirty="0" smtClean="0"/>
-              <a:t> 5</a:t>
-            </a:r>
-            <a:r>
-              <a:rPr lang="cs-CZ" dirty="0" smtClean="0"/>
-              <a:t>, 2017</a:t>
+              <a:t> 5, 2017</a:t>
             </a:r>
             <a:endParaRPr lang="en-US" dirty="0" smtClean="0"/>
           </a:p>
@@ -2402,7 +2394,6 @@
               <a:rPr lang="cs-CZ" sz="1100" b="0" dirty="0" smtClean="0"/>
               <a:t>Kryštof Sýkora, Marek Szeles</a:t>
             </a:r>
-            <a:endParaRPr lang="cs-CZ" sz="1100" b="0" dirty="0" smtClean="0"/>
           </a:p>
         </p:txBody>
       </p:sp>
@@ -2464,7 +2455,7 @@
           <a:graphicData uri="http://schemas.openxmlformats.org/presentationml/2006/ole">
             <mc:AlternateContent xmlns:mc="http://schemas.openxmlformats.org/markup-compatibility/2006">
               <mc:Choice xmlns:v="urn:schemas-microsoft-com:vml" Requires="v">
-                <p:oleObj spid="_x0000_s51232" name="think-cell Slide" r:id="rId5" imgW="270" imgH="270" progId="TCLayout.ActiveDocument.1">
+                <p:oleObj spid="_x0000_s51233" name="think-cell Slide" r:id="rId5" imgW="270" imgH="270" progId="TCLayout.ActiveDocument.1">
                   <p:embed/>
                 </p:oleObj>
               </mc:Choice>
@@ -2616,8 +2607,8 @@
         </p:nvSpPr>
         <p:spPr bwMode="auto">
           <a:xfrm>
-            <a:off x="874040" y="4090879"/>
-            <a:ext cx="8269960" cy="559093"/>
+            <a:off x="874040" y="4623030"/>
+            <a:ext cx="8269960" cy="697683"/>
           </a:xfrm>
           <a:prstGeom prst="rect">
             <a:avLst/>
@@ -2645,12 +2636,56 @@
           <a:lstStyle/>
           <a:p>
             <a:r>
+              <a:rPr lang="cs-CZ" sz="2000" b="1" dirty="0" err="1" smtClean="0"/>
+              <a:t>Helps</a:t>
+            </a:r>
+            <a:r>
               <a:rPr lang="cs-CZ" sz="2000" b="1" dirty="0" smtClean="0"/>
-              <a:t>Project run </a:t>
+              <a:t> </a:t>
             </a:r>
             <a:r>
               <a:rPr lang="cs-CZ" sz="2000" b="1" dirty="0" err="1" smtClean="0"/>
-              <a:t>overview</a:t>
+              <a:t>search</a:t>
+            </a:r>
+            <a:r>
+              <a:rPr lang="cs-CZ" sz="2000" b="1" dirty="0" smtClean="0"/>
+              <a:t> </a:t>
+            </a:r>
+            <a:r>
+              <a:rPr lang="cs-CZ" sz="2000" b="1" dirty="0" err="1" smtClean="0"/>
+              <a:t>for</a:t>
+            </a:r>
+            <a:r>
+              <a:rPr lang="cs-CZ" sz="2000" b="1" dirty="0" smtClean="0"/>
+              <a:t> </a:t>
+            </a:r>
+            <a:r>
+              <a:rPr lang="cs-CZ" sz="2000" b="1" dirty="0" err="1" smtClean="0"/>
+              <a:t>relevant</a:t>
+            </a:r>
+            <a:r>
+              <a:rPr lang="cs-CZ" sz="2000" b="1" dirty="0" smtClean="0"/>
+              <a:t> </a:t>
+            </a:r>
+            <a:r>
+              <a:rPr lang="cs-CZ" sz="2000" b="1" dirty="0" err="1" smtClean="0"/>
+              <a:t>employees</a:t>
+            </a:r>
+            <a:r>
+              <a:rPr lang="cs-CZ" sz="2000" b="1" dirty="0" smtClean="0"/>
+              <a:t> </a:t>
+            </a:r>
+            <a:r>
+              <a:rPr lang="cs-CZ" sz="2000" b="1" dirty="0" err="1" smtClean="0"/>
+              <a:t>for</a:t>
+            </a:r>
+            <a:r>
+              <a:rPr lang="cs-CZ" sz="2000" b="1" dirty="0" smtClean="0"/>
+              <a:t> a </a:t>
+            </a:r>
+            <a:r>
+              <a:rPr lang="cs-CZ" sz="2000" b="1" dirty="0" err="1" smtClean="0"/>
+              <a:t>project</a:t>
             </a:r>
             <a:endParaRPr lang="en-US" sz="2000" b="1" dirty="0"/>
           </a:p>
@@ -2666,8 +2701,8 @@
         </p:nvSpPr>
         <p:spPr bwMode="auto">
           <a:xfrm>
-            <a:off x="874988" y="4090879"/>
-            <a:ext cx="342236" cy="356673"/>
+            <a:off x="874988" y="4623030"/>
+            <a:ext cx="342236" cy="445086"/>
           </a:xfrm>
           <a:prstGeom prst="rtTriangle">
             <a:avLst/>
@@ -2704,8 +2739,8 @@
         </p:nvSpPr>
         <p:spPr bwMode="auto">
           <a:xfrm>
-            <a:off x="750825" y="4447552"/>
-            <a:ext cx="466399" cy="559094"/>
+            <a:off x="750825" y="5068116"/>
+            <a:ext cx="466399" cy="697684"/>
           </a:xfrm>
           <a:custGeom>
             <a:avLst/>
@@ -2782,262 +2817,8 @@
         </p:nvSpPr>
         <p:spPr>
           <a:xfrm>
-            <a:off x="728619" y="4540592"/>
-            <a:ext cx="309620" cy="373013"/>
-          </a:xfrm>
-          <a:prstGeom prst="rightArrow">
-            <a:avLst/>
-          </a:prstGeom>
-          <a:solidFill>
-            <a:schemeClr val="bg1"/>
-          </a:solidFill>
-          <a:ln w="9525" cap="flat" cmpd="sng" algn="ctr">
-            <a:noFill/>
-            <a:prstDash val="solid"/>
-            <a:miter lim="800000"/>
-          </a:ln>
-          <a:effectLst/>
-          <a:extLst>
-            <a:ext uri="{91240B29-F687-4F45-9708-019B960494DF}">
-              <a14:hiddenLine xmlns:a14="http://schemas.microsoft.com/office/drawing/2010/main" w="9525" cap="flat" cmpd="sng" algn="ctr">
-                <a:solidFill>
-                  <a:schemeClr val="bg1"/>
-                </a:solidFill>
-                <a:prstDash val="solid"/>
-                <a:miter lim="800000"/>
-              </a14:hiddenLine>
-            </a:ext>
-          </a:extLst>
-        </p:spPr>
-        <p:style>
-          <a:lnRef idx="2">
-            <a:schemeClr val="accent1">
-              <a:shade val="50000"/>
-            </a:schemeClr>
-          </a:lnRef>
-          <a:fillRef idx="1">
-            <a:schemeClr val="accent1"/>
-          </a:fillRef>
-          <a:effectRef idx="0">
-            <a:schemeClr val="accent1"/>
-          </a:effectRef>
-          <a:fontRef idx="minor">
-            <a:schemeClr val="lt1"/>
-          </a:fontRef>
-        </p:style>
-        <p:txBody>
-          <a:bodyPr tIns="90000" bIns="90000" rtlCol="0" anchor="ctr" anchorCtr="0"/>
-          <a:lstStyle/>
-          <a:p>
-            <a:pPr algn="ctr"/>
-            <a:endParaRPr lang="en-US" sz="1400" dirty="0" smtClean="0">
-              <a:solidFill>
-                <a:srgbClr val="000000"/>
-              </a:solidFill>
-              <a:latin typeface="Arial" pitchFamily="34" charset="0"/>
-              <a:cs typeface="Arial" pitchFamily="34" charset="0"/>
-            </a:endParaRPr>
-          </a:p>
-        </p:txBody>
-      </p:sp>
-      <p:sp>
-        <p:nvSpPr>
-          <p:cNvPr id="10" name="Rectangle 3"/>
-          <p:cNvSpPr>
-            <a:spLocks noChangeArrowheads="1"/>
-          </p:cNvSpPr>
-          <p:nvPr/>
-        </p:nvSpPr>
-        <p:spPr bwMode="auto">
-          <a:xfrm>
-            <a:off x="874040" y="5173797"/>
-            <a:ext cx="8269960" cy="559093"/>
-          </a:xfrm>
-          <a:prstGeom prst="rect">
-            <a:avLst/>
-          </a:prstGeom>
-          <a:gradFill>
-            <a:gsLst>
-              <a:gs pos="20000">
-                <a:schemeClr val="bg2"/>
-              </a:gs>
-              <a:gs pos="100000">
-                <a:schemeClr val="bg1"/>
-              </a:gs>
-            </a:gsLst>
-            <a:lin ang="0" scaled="0"/>
-          </a:gradFill>
-          <a:ln w="9525" algn="ctr">
-            <a:noFill/>
-            <a:miter lim="800000"/>
-            <a:headEnd type="none" w="lg" len="lg"/>
-            <a:tailEnd type="none" w="lg" len="lg"/>
-          </a:ln>
-        </p:spPr>
-        <p:txBody>
-          <a:bodyPr lIns="504000" tIns="91440" rIns="180000" bIns="91440" anchor="ctr"/>
-          <a:lstStyle/>
-          <a:p>
-            <a:r>
-              <a:rPr lang="cs-CZ" sz="2000" b="1" dirty="0" err="1" smtClean="0"/>
-              <a:t>Lessons</a:t>
-            </a:r>
-            <a:r>
-              <a:rPr lang="cs-CZ" sz="2000" b="1" dirty="0" smtClean="0"/>
-              <a:t> </a:t>
-            </a:r>
-            <a:r>
-              <a:rPr lang="cs-CZ" sz="2000" b="1" dirty="0" err="1" smtClean="0"/>
-              <a:t>learned</a:t>
-            </a:r>
-            <a:r>
-              <a:rPr lang="cs-CZ" sz="2000" b="1" dirty="0" smtClean="0"/>
-              <a:t>, </a:t>
-            </a:r>
-            <a:r>
-              <a:rPr lang="cs-CZ" sz="2000" b="1" dirty="0" err="1" smtClean="0"/>
-              <a:t>individual</a:t>
-            </a:r>
-            <a:r>
-              <a:rPr lang="cs-CZ" sz="2000" b="1" dirty="0" smtClean="0"/>
-              <a:t> </a:t>
-            </a:r>
-            <a:r>
-              <a:rPr lang="cs-CZ" sz="2000" b="1" dirty="0" err="1" smtClean="0"/>
-              <a:t>reviews</a:t>
-            </a:r>
-            <a:endParaRPr lang="en-US" sz="2000" b="1" dirty="0"/>
-          </a:p>
-        </p:txBody>
-      </p:sp>
-      <p:sp>
-        <p:nvSpPr>
-          <p:cNvPr id="11" name="AutoShape 5"/>
-          <p:cNvSpPr>
-            <a:spLocks noChangeArrowheads="1"/>
-          </p:cNvSpPr>
-          <p:nvPr/>
-        </p:nvSpPr>
-        <p:spPr bwMode="auto">
-          <a:xfrm>
-            <a:off x="874988" y="5173797"/>
-            <a:ext cx="342236" cy="356673"/>
-          </a:xfrm>
-          <a:prstGeom prst="rtTriangle">
-            <a:avLst/>
-          </a:prstGeom>
-          <a:solidFill>
-            <a:schemeClr val="accent1">
-              <a:lumMod val="60000"/>
-              <a:lumOff val="40000"/>
-            </a:schemeClr>
-          </a:solidFill>
-          <a:ln w="12700">
-            <a:noFill/>
-            <a:miter lim="800000"/>
-            <a:headEnd/>
-            <a:tailEnd/>
-          </a:ln>
-          <a:effectLst/>
-        </p:spPr>
-        <p:txBody>
-          <a:bodyPr wrap="none" anchor="ctr"/>
-          <a:lstStyle/>
-          <a:p>
-            <a:endParaRPr lang="en-US" sz="1600"/>
-          </a:p>
-        </p:txBody>
-      </p:sp>
-      <p:sp>
-        <p:nvSpPr>
-          <p:cNvPr id="12" name="Freeform 11"/>
-          <p:cNvSpPr>
-            <a:spLocks/>
-          </p:cNvSpPr>
-          <p:nvPr/>
-        </p:nvSpPr>
-        <p:spPr bwMode="auto">
-          <a:xfrm>
-            <a:off x="750825" y="5530470"/>
-            <a:ext cx="466399" cy="559094"/>
-          </a:xfrm>
-          <a:custGeom>
-            <a:avLst/>
-            <a:gdLst/>
-            <a:ahLst/>
-            <a:cxnLst>
-              <a:cxn ang="0">
-                <a:pos x="1310" y="0"/>
-              </a:cxn>
-              <a:cxn ang="0">
-                <a:pos x="1310" y="459"/>
-              </a:cxn>
-              <a:cxn ang="0">
-                <a:pos x="0" y="460"/>
-              </a:cxn>
-              <a:cxn ang="0">
-                <a:pos x="1" y="0"/>
-              </a:cxn>
-              <a:cxn ang="0">
-                <a:pos x="1310" y="0"/>
-              </a:cxn>
-            </a:cxnLst>
-            <a:rect l="0" t="0" r="r" b="b"/>
-            <a:pathLst>
-              <a:path w="1310" h="460">
-                <a:moveTo>
-                  <a:pt x="1310" y="0"/>
-                </a:moveTo>
-                <a:lnTo>
-                  <a:pt x="1310" y="459"/>
-                </a:lnTo>
-                <a:lnTo>
-                  <a:pt x="0" y="460"/>
-                </a:lnTo>
-                <a:lnTo>
-                  <a:pt x="1" y="0"/>
-                </a:lnTo>
-                <a:lnTo>
-                  <a:pt x="1310" y="0"/>
-                </a:lnTo>
-                <a:close/>
-              </a:path>
-            </a:pathLst>
-          </a:custGeom>
-          <a:solidFill>
-            <a:srgbClr val="4472C4"/>
-          </a:solidFill>
-          <a:ln w="12700">
-            <a:noFill/>
-            <a:round/>
-            <a:headEnd/>
-            <a:tailEnd/>
-          </a:ln>
-          <a:effectLst/>
-        </p:spPr>
-        <p:txBody>
-          <a:bodyPr wrap="none" anchor="ctr"/>
-          <a:lstStyle/>
-          <a:p>
-            <a:pPr algn="ctr"/>
-            <a:endParaRPr lang="en-US" sz="2400" b="1" dirty="0">
-              <a:solidFill>
-                <a:schemeClr val="bg1"/>
-              </a:solidFill>
-            </a:endParaRPr>
-          </a:p>
-        </p:txBody>
-      </p:sp>
-      <p:sp>
-        <p:nvSpPr>
-          <p:cNvPr id="13" name="Right Arrow 12"/>
-          <p:cNvSpPr/>
-          <p:nvPr/>
-        </p:nvSpPr>
-        <p:spPr>
-          <a:xfrm>
-            <a:off x="728619" y="5623510"/>
-            <a:ext cx="309620" cy="373013"/>
+            <a:off x="728619" y="5184219"/>
+            <a:ext cx="309620" cy="465477"/>
           </a:xfrm>
           <a:prstGeom prst="rightArrow">
             <a:avLst/>
@@ -3105,7 +2886,7 @@
         <p:spPr bwMode="auto">
           <a:xfrm>
             <a:off x="874040" y="1944099"/>
-            <a:ext cx="8269960" cy="559093"/>
+            <a:ext cx="8269960" cy="697683"/>
           </a:xfrm>
           <a:prstGeom prst="rect">
             <a:avLst/>
@@ -3167,7 +2948,7 @@
         <p:spPr bwMode="auto">
           <a:xfrm>
             <a:off x="874988" y="1944099"/>
-            <a:ext cx="342236" cy="356673"/>
+            <a:ext cx="342236" cy="445086"/>
           </a:xfrm>
           <a:prstGeom prst="rtTriangle">
             <a:avLst/>
@@ -3204,8 +2985,8 @@
         </p:nvSpPr>
         <p:spPr bwMode="auto">
           <a:xfrm>
-            <a:off x="750825" y="2300772"/>
-            <a:ext cx="466399" cy="559094"/>
+            <a:off x="750825" y="2389185"/>
+            <a:ext cx="466399" cy="697684"/>
           </a:xfrm>
           <a:custGeom>
             <a:avLst/>
@@ -3282,8 +3063,8 @@
         </p:nvSpPr>
         <p:spPr>
           <a:xfrm>
-            <a:off x="728619" y="2393812"/>
-            <a:ext cx="309620" cy="373013"/>
+            <a:off x="728619" y="2505288"/>
+            <a:ext cx="309620" cy="465477"/>
           </a:xfrm>
           <a:prstGeom prst="rightArrow">
             <a:avLst/>
@@ -3350,8 +3131,8 @@
         </p:nvSpPr>
         <p:spPr bwMode="auto">
           <a:xfrm>
-            <a:off x="874040" y="3027017"/>
-            <a:ext cx="8269960" cy="559093"/>
+            <a:off x="874040" y="3295454"/>
+            <a:ext cx="8269960" cy="697683"/>
           </a:xfrm>
           <a:prstGeom prst="rect">
             <a:avLst/>
@@ -3379,12 +3160,68 @@
           <a:lstStyle/>
           <a:p>
             <a:r>
+              <a:rPr lang="cs-CZ" sz="2000" b="1" dirty="0" err="1" smtClean="0"/>
+              <a:t>Allows</a:t>
+            </a:r>
+            <a:r>
               <a:rPr lang="cs-CZ" sz="2000" b="1" dirty="0" smtClean="0"/>
-              <a:t>3 </a:t>
+              <a:t> </a:t>
             </a:r>
             <a:r>
               <a:rPr lang="cs-CZ" sz="2000" b="1" dirty="0" err="1" smtClean="0"/>
-              <a:t>roles</a:t>
+              <a:t>for</a:t>
+            </a:r>
+            <a:r>
+              <a:rPr lang="cs-CZ" sz="2000" b="1" dirty="0" smtClean="0"/>
+              <a:t> </a:t>
+            </a:r>
+            <a:r>
+              <a:rPr lang="cs-CZ" sz="2000" b="1" dirty="0" err="1" smtClean="0"/>
+              <a:t>administration</a:t>
+            </a:r>
+            <a:r>
+              <a:rPr lang="cs-CZ" sz="2000" b="1" dirty="0" smtClean="0"/>
+              <a:t> </a:t>
+            </a:r>
+            <a:r>
+              <a:rPr lang="cs-CZ" sz="2000" b="1" dirty="0" err="1" smtClean="0"/>
+              <a:t>of</a:t>
+            </a:r>
+            <a:r>
+              <a:rPr lang="cs-CZ" sz="2000" b="1" dirty="0" smtClean="0"/>
+              <a:t> </a:t>
+            </a:r>
+            <a:r>
+              <a:rPr lang="cs-CZ" sz="2000" b="1" dirty="0" err="1" smtClean="0"/>
+              <a:t>staff</a:t>
+            </a:r>
+            <a:r>
+              <a:rPr lang="cs-CZ" sz="2000" b="1" dirty="0" smtClean="0"/>
+              <a:t>, </a:t>
+            </a:r>
+            <a:r>
+              <a:rPr lang="cs-CZ" sz="2000" b="1" dirty="0" err="1" smtClean="0"/>
+              <a:t>projects</a:t>
+            </a:r>
+            <a:r>
+              <a:rPr lang="cs-CZ" sz="2000" b="1" dirty="0" smtClean="0"/>
+              <a:t>, </a:t>
+            </a:r>
+            <a:r>
+              <a:rPr lang="cs-CZ" sz="2000" b="1" dirty="0" err="1" smtClean="0"/>
+              <a:t>offices</a:t>
+            </a:r>
+            <a:r>
+              <a:rPr lang="cs-CZ" sz="2000" b="1" dirty="0" smtClean="0"/>
+              <a:t>, </a:t>
+            </a:r>
+            <a:r>
+              <a:rPr lang="cs-CZ" sz="2000" b="1" dirty="0" err="1" smtClean="0"/>
+              <a:t>etc</a:t>
+            </a:r>
+            <a:r>
+              <a:rPr lang="cs-CZ" sz="2000" b="1" dirty="0" smtClean="0"/>
+              <a:t>.</a:t>
             </a:r>
             <a:endParaRPr lang="en-US" sz="2000" b="1" dirty="0"/>
           </a:p>
@@ -3400,8 +3237,8 @@
         </p:nvSpPr>
         <p:spPr bwMode="auto">
           <a:xfrm>
-            <a:off x="874988" y="3027017"/>
-            <a:ext cx="342236" cy="356673"/>
+            <a:off x="874988" y="3295454"/>
+            <a:ext cx="342236" cy="445086"/>
           </a:xfrm>
           <a:prstGeom prst="rtTriangle">
             <a:avLst/>
@@ -3438,8 +3275,8 @@
         </p:nvSpPr>
         <p:spPr bwMode="auto">
           <a:xfrm>
-            <a:off x="750825" y="3383690"/>
-            <a:ext cx="466399" cy="559094"/>
+            <a:off x="750825" y="3740540"/>
+            <a:ext cx="466399" cy="697684"/>
           </a:xfrm>
           <a:custGeom>
             <a:avLst/>
@@ -3516,8 +3353,8 @@
         </p:nvSpPr>
         <p:spPr>
           <a:xfrm>
-            <a:off x="728619" y="3476730"/>
-            <a:ext cx="309620" cy="373013"/>
+            <a:off x="728619" y="3856644"/>
+            <a:ext cx="309620" cy="465477"/>
           </a:xfrm>
           <a:prstGeom prst="rightArrow">
             <a:avLst/>
@@ -3632,7 +3469,7 @@
           <a:graphicData uri="http://schemas.openxmlformats.org/presentationml/2006/ole">
             <mc:AlternateContent xmlns:mc="http://schemas.openxmlformats.org/markup-compatibility/2006">
               <mc:Choice xmlns:v="urn:schemas-microsoft-com:vml" Requires="v">
-                <p:oleObj spid="_x0000_s93186" name="think-cell Slide" r:id="rId97" imgW="270" imgH="270" progId="TCLayout.ActiveDocument.1">
+                <p:oleObj spid="_x0000_s93187" name="think-cell Slide" r:id="rId97" imgW="270" imgH="270" progId="TCLayout.ActiveDocument.1">
                   <p:embed/>
                 </p:oleObj>
               </mc:Choice>
@@ -14366,7 +14203,7 @@
         </p:blipFill>
         <p:spPr>
           <a:xfrm>
-            <a:off x="618565" y="2106827"/>
+            <a:off x="618566" y="2198831"/>
             <a:ext cx="8001000" cy="2313803"/>
           </a:xfrm>
           <a:prstGeom prst="rect">
@@ -14416,6 +14253,54 @@
           <a:xfrm>
             <a:off x="4840941" y="4591491"/>
             <a:ext cx="3774816" cy="1656226"/>
+          </a:xfrm>
+          <a:prstGeom prst="rect">
+            <a:avLst/>
+          </a:prstGeom>
+        </p:spPr>
+      </p:pic>
+      <p:pic>
+        <p:nvPicPr>
+          <p:cNvPr id="3" name="Picture 2"/>
+          <p:cNvPicPr>
+            <a:picLocks noChangeAspect="1"/>
+          </p:cNvPicPr>
+          <p:nvPr/>
+        </p:nvPicPr>
+        <p:blipFill>
+          <a:blip r:embed="rId6"/>
+          <a:stretch>
+            <a:fillRect/>
+          </a:stretch>
+        </p:blipFill>
+        <p:spPr>
+          <a:xfrm>
+            <a:off x="5771591" y="76413"/>
+            <a:ext cx="2847975" cy="923925"/>
+          </a:xfrm>
+          <a:prstGeom prst="rect">
+            <a:avLst/>
+          </a:prstGeom>
+        </p:spPr>
+      </p:pic>
+      <p:pic>
+        <p:nvPicPr>
+          <p:cNvPr id="4" name="Picture 3"/>
+          <p:cNvPicPr>
+            <a:picLocks noChangeAspect="1"/>
+          </p:cNvPicPr>
+          <p:nvPr/>
+        </p:nvPicPr>
+        <p:blipFill>
+          <a:blip r:embed="rId7"/>
+          <a:stretch>
+            <a:fillRect/>
+          </a:stretch>
+        </p:blipFill>
+        <p:spPr>
+          <a:xfrm>
+            <a:off x="3533216" y="1180654"/>
+            <a:ext cx="5086350" cy="1339728"/>
           </a:xfrm>
           <a:prstGeom prst="rect">
             <a:avLst/>
@@ -14534,6 +14419,7 @@
 <p:tagLst xmlns:a="http://schemas.openxmlformats.org/drawingml/2006/main" xmlns:r="http://schemas.openxmlformats.org/officeDocument/2006/relationships" xmlns:p="http://schemas.openxmlformats.org/presentationml/2006/main">
   <p:tag name="THINKCELLPRESENTATIONDONOTDELETE" val="&lt;?xml version=&quot;1.0&quot; encoding=&quot;UTF-16&quot; standalone=&quot;yes&quot;?&gt;&lt;root reqver=&quot;23045&quot;&gt;&lt;version val=&quot;24178&quot;/&gt;&lt;CPresentation id=&quot;1&quot;&gt;&lt;m_precDefaultNumber&gt;&lt;m_bNumberIsYear val=&quot;1&quot;/&gt;&lt;m_chMinusSymbol&gt;-&lt;/m_chMinusSymbol&gt;&lt;m_chDecimalSymbol17909&gt;.&lt;/m_chDecimalSymbol17909&gt;&lt;m_nGroupingDigits17909 val=&quot;3&quot;/&gt;&lt;m_chGroupingSymbol17909&gt; &lt;/m_chGroupingSymbol17909&gt;&lt;m_yearfmt&gt;&lt;begin val=&quot;0&quot;/&gt;&lt;end val=&quot;4&quot;/&gt;&lt;/m_yearfmt&gt;&lt;/m_precDefaultNumber&gt;&lt;m_precDefaultPercent&gt;&lt;m_bNumberIsYear val=&quot;1&quot;/&gt;&lt;m_chMinusSymbol&gt;-&lt;/m_chMinusSymbol&gt;&lt;m_nDecimalDigits17909 val=&quot;0&quot;/&gt;&lt;m_chDecimalSymbol17909&gt;.&lt;/m_chDecimalSymbol17909&gt;&lt;m_nGroupingDigits17909 val=&quot;3&quot;/&gt;&lt;m_chGroupingSymbol17909&gt; &lt;/m_chGroupingSymbol17909&gt;&lt;m_strSuffix17909&gt;%&lt;/m_strSuffix17909&gt;&lt;m_yearfmt&gt;&lt;begin val=&quot;0&quot;/&gt;&lt;end val=&quot;4&quot;/&gt;&lt;/m_yearfmt&gt;&lt;/m_precDefaultPercent&gt;&lt;m_precDefaultDate&gt;&lt;m_bNumberIsYear val=&quot;0&quot;/&gt;&lt;m_strFormatTime&gt;%d. %1 %Y&lt;/m_strFormatTime&gt;&lt;m_yearfmt&gt;&lt;begin val=&quot;0&quot;/&gt;&lt;end val=&quot;0&quot;/&gt;&lt;/m_yearfmt&gt;&lt;/m_precDefaultDate&gt;&lt;m_precDefaultYear&gt;&lt;m_bNumberIsYear val=&quot;0&quot;/&gt;&lt;m_strFormatTime&gt;%Y&lt;/m_strFormatTime&gt;&lt;m_yearfmt&gt;&lt;begin val=&quot;0&quot;/&gt;&lt;end val=&quot;0&quot;/&gt;&lt;/m_yearfmt&gt;&lt;/m_precDefaultYear&gt;&lt;m_precDefaultQuarter&gt;&lt;m_bNumberIsYear val=&quot;0&quot;/&gt;&lt;m_strFormatTime&gt;Q%5&lt;/m_strFormatTime&gt;&lt;m_yearfmt&gt;&lt;begin val=&quot;0&quot;/&gt;&lt;end val=&quot;4&quot;/&gt;&lt;/m_yearfmt&gt;&lt;/m_precDefaultQuarter&gt;&lt;m_precDefaultMonth&gt;&lt;m_bNumberIsYear val=&quot;0&quot;/&gt;&lt;m_strFormatTime&gt;%1&lt;/m_strFormatTime&gt;&lt;m_yearfmt&gt;&lt;begin val=&quot;0&quot;/&gt;&lt;end val=&quot;4&quot;/&gt;&lt;/m_yearfmt&gt;&lt;/m_precDefaultMonth&gt;&lt;m_precDefaultWeek&gt;&lt;m_bNumberIsYear val=&quot;0&quot;/&gt;&lt;m_strFormatTime&gt;%4&lt;/m_strFormatTime&gt;&lt;m_yearfmt&gt;&lt;begin val=&quot;0&quot;/&gt;&lt;end val=&quot;4&quot;/&gt;&lt;/m_yearfmt&gt;&lt;/m_precDefaultWeek&gt;&lt;m_precDefaultDay&gt;&lt;m_bNumberIsYear val=&quot;0&quot;/&gt;&lt;m_strFormatTime&gt;%#d&lt;/m_strFormatTime&gt;&lt;m_yearfmt&gt;&lt;begin val=&quot;0&quot;/&gt;&lt;end val=&quot;4&quot;/&gt;&lt;/m_yearfmt&gt;&lt;/m_precDefaultDay&gt;&lt;m_mruColor&gt;&lt;m_vecMRU length=&quot;2&quot;&gt;&lt;elem m_fUsage=&quot;1.00000000000000000000E+000&quot;&gt;&lt;m_msothmcolidx val=&quot;0&quot;/&gt;&lt;m_rgb r=&quot;9D&quot; g=&quot;CA&quot; b=&quot;A5&quot;/&gt;&lt;m_nBrightness val=&quot;0&quot;/&gt;&lt;/elem&gt;&lt;elem m_fUsage=&quot;9.00000000000000020000E-001&quot;&gt;&lt;m_msothmcolidx val=&quot;0&quot;/&gt;&lt;m_rgb r=&quot;4A&quot; g=&quot;7C&quot; b=&quot;CE&quot;/&gt;&lt;m_nBrightness val=&quot;0&quot;/&gt;&lt;/elem&gt;&lt;/m_vecMRU&gt;&lt;/m_mruColor&gt;&lt;m_eweekdayFirstOfWeek val=&quot;2&quot;/&gt;&lt;m_eweekdayFirstOfWorkweek val=&quot;2&quot;/&gt;&lt;m_eweekdayFirstOfWeekend val=&quot;7&quot;/&gt;&lt;/CPresentation&gt;&lt;/root&gt;"/>
   <p:tag name="THINKCELLUNDODONOTDELETE" val="0"/>
+  <p:tag name="EE4P_STYLE_ID" val="0fbcd015-fbac-494c-bcad-77fcf24a62f5"/>
 </p:tagLst>
 </file>
 

</xml_diff>

<commit_message>
cleanup + doc update finish
</commit_message>
<xml_diff>
--- a/docs/WIP/Staffr_status_1.pptx
+++ b/docs/WIP/Staffr_status_1.pptx
@@ -18,15 +18,15 @@
   <p:notesSz cx="6797675" cy="9926638"/>
   <p:embeddedFontLst>
     <p:embeddedFont>
-      <p:font typeface="Technika-Bold" panose="00000600000000000000" charset="-18"/>
+      <p:font typeface="Technika" panose="020B0604020202020204" charset="-18"/>
       <p:regular r:id="rId8"/>
+      <p:bold r:id="rId9"/>
+      <p:italic r:id="rId10"/>
+      <p:boldItalic r:id="rId11"/>
     </p:embeddedFont>
     <p:embeddedFont>
-      <p:font typeface="Technika" panose="020B0604020202020204" charset="-18"/>
-      <p:regular r:id="rId9"/>
-      <p:bold r:id="rId10"/>
-      <p:italic r:id="rId11"/>
-      <p:boldItalic r:id="rId12"/>
+      <p:font typeface="Technika-Bold" panose="00000600000000000000" charset="-18"/>
+      <p:regular r:id="rId12"/>
     </p:embeddedFont>
     <p:embeddedFont>
       <p:font typeface="Calibri" panose="020F0502020204030204" pitchFamily="34" charset="0"/>
@@ -263,7 +263,7 @@
           <a:p>
             <a:fld id="{562799A2-967B-4B6D-8BF4-047FB8CEA12E}" type="datetimeFigureOut">
               <a:rPr lang="cs-CZ" smtClean="0"/>
-              <a:t>5.10.2017</a:t>
+              <a:t>7.1.2018</a:t>
             </a:fld>
             <a:endParaRPr lang="cs-CZ"/>
           </a:p>
@@ -890,7 +890,7 @@
           <a:graphicData uri="http://schemas.openxmlformats.org/presentationml/2006/ole">
             <mc:AlternateContent xmlns:mc="http://schemas.openxmlformats.org/markup-compatibility/2006">
               <mc:Choice xmlns:v="urn:schemas-microsoft-com:vml" Requires="v">
-                <p:oleObj spid="_x0000_s25688" name="think-cell Slide" r:id="rId4" imgW="270" imgH="270" progId="TCLayout.ActiveDocument.1">
+                <p:oleObj spid="_x0000_s25689" name="think-cell Slide" r:id="rId4" imgW="270" imgH="270" progId="TCLayout.ActiveDocument.1">
                   <p:embed/>
                 </p:oleObj>
               </mc:Choice>
@@ -1498,7 +1498,7 @@
           <a:graphicData uri="http://schemas.openxmlformats.org/presentationml/2006/ole">
             <mc:AlternateContent xmlns:mc="http://schemas.openxmlformats.org/markup-compatibility/2006">
               <mc:Choice xmlns:v="urn:schemas-microsoft-com:vml" Requires="v">
-                <p:oleObj spid="_x0000_s92163" name="think-cell Slide" r:id="rId4" imgW="270" imgH="270" progId="TCLayout.ActiveDocument.1">
+                <p:oleObj spid="_x0000_s92164" name="think-cell Slide" r:id="rId4" imgW="270" imgH="270" progId="TCLayout.ActiveDocument.1">
                   <p:embed/>
                 </p:oleObj>
               </mc:Choice>
@@ -1704,7 +1704,7 @@
           <a:graphicData uri="http://schemas.openxmlformats.org/presentationml/2006/ole">
             <mc:AlternateContent xmlns:mc="http://schemas.openxmlformats.org/markup-compatibility/2006">
               <mc:Choice xmlns:v="urn:schemas-microsoft-com:vml" Requires="v">
-                <p:oleObj spid="_x0000_s1186" name="think-cell Slide" r:id="rId10" imgW="270" imgH="270" progId="TCLayout.ActiveDocument.1">
+                <p:oleObj spid="_x0000_s1187" name="think-cell Slide" r:id="rId10" imgW="270" imgH="270" progId="TCLayout.ActiveDocument.1">
                   <p:embed/>
                 </p:oleObj>
               </mc:Choice>
@@ -2455,7 +2455,7 @@
           <a:graphicData uri="http://schemas.openxmlformats.org/presentationml/2006/ole">
             <mc:AlternateContent xmlns:mc="http://schemas.openxmlformats.org/markup-compatibility/2006">
               <mc:Choice xmlns:v="urn:schemas-microsoft-com:vml" Requires="v">
-                <p:oleObj spid="_x0000_s51233" name="think-cell Slide" r:id="rId5" imgW="270" imgH="270" progId="TCLayout.ActiveDocument.1">
+                <p:oleObj spid="_x0000_s51234" name="think-cell Slide" r:id="rId5" imgW="270" imgH="270" progId="TCLayout.ActiveDocument.1">
                   <p:embed/>
                 </p:oleObj>
               </mc:Choice>
@@ -3469,7 +3469,7 @@
           <a:graphicData uri="http://schemas.openxmlformats.org/presentationml/2006/ole">
             <mc:AlternateContent xmlns:mc="http://schemas.openxmlformats.org/markup-compatibility/2006">
               <mc:Choice xmlns:v="urn:schemas-microsoft-com:vml" Requires="v">
-                <p:oleObj spid="_x0000_s93187" name="think-cell Slide" r:id="rId97" imgW="270" imgH="270" progId="TCLayout.ActiveDocument.1">
+                <p:oleObj spid="_x0000_s93188" name="think-cell Slide" r:id="rId97" imgW="270" imgH="270" progId="TCLayout.ActiveDocument.1">
                   <p:embed/>
                 </p:oleObj>
               </mc:Choice>
@@ -3580,7 +3580,12 @@
             <p:ph type="title"/>
           </p:nvPr>
         </p:nvSpPr>
-        <p:spPr/>
+        <p:spPr>
+          <a:xfrm>
+            <a:off x="2094400" y="427981"/>
+            <a:ext cx="6705823" cy="863485"/>
+          </a:xfrm>
+        </p:spPr>
         <p:txBody>
           <a:bodyPr/>
           <a:lstStyle/>
@@ -14419,7 +14424,6 @@
 <p:tagLst xmlns:a="http://schemas.openxmlformats.org/drawingml/2006/main" xmlns:r="http://schemas.openxmlformats.org/officeDocument/2006/relationships" xmlns:p="http://schemas.openxmlformats.org/presentationml/2006/main">
   <p:tag name="THINKCELLPRESENTATIONDONOTDELETE" val="&lt;?xml version=&quot;1.0&quot; encoding=&quot;UTF-16&quot; standalone=&quot;yes&quot;?&gt;&lt;root reqver=&quot;23045&quot;&gt;&lt;version val=&quot;24178&quot;/&gt;&lt;CPresentation id=&quot;1&quot;&gt;&lt;m_precDefaultNumber&gt;&lt;m_bNumberIsYear val=&quot;1&quot;/&gt;&lt;m_chMinusSymbol&gt;-&lt;/m_chMinusSymbol&gt;&lt;m_chDecimalSymbol17909&gt;.&lt;/m_chDecimalSymbol17909&gt;&lt;m_nGroupingDigits17909 val=&quot;3&quot;/&gt;&lt;m_chGroupingSymbol17909&gt; &lt;/m_chGroupingSymbol17909&gt;&lt;m_yearfmt&gt;&lt;begin val=&quot;0&quot;/&gt;&lt;end val=&quot;4&quot;/&gt;&lt;/m_yearfmt&gt;&lt;/m_precDefaultNumber&gt;&lt;m_precDefaultPercent&gt;&lt;m_bNumberIsYear val=&quot;1&quot;/&gt;&lt;m_chMinusSymbol&gt;-&lt;/m_chMinusSymbol&gt;&lt;m_nDecimalDigits17909 val=&quot;0&quot;/&gt;&lt;m_chDecimalSymbol17909&gt;.&lt;/m_chDecimalSymbol17909&gt;&lt;m_nGroupingDigits17909 val=&quot;3&quot;/&gt;&lt;m_chGroupingSymbol17909&gt; &lt;/m_chGroupingSymbol17909&gt;&lt;m_strSuffix17909&gt;%&lt;/m_strSuffix17909&gt;&lt;m_yearfmt&gt;&lt;begin val=&quot;0&quot;/&gt;&lt;end val=&quot;4&quot;/&gt;&lt;/m_yearfmt&gt;&lt;/m_precDefaultPercent&gt;&lt;m_precDefaultDate&gt;&lt;m_bNumberIsYear val=&quot;0&quot;/&gt;&lt;m_strFormatTime&gt;%d. %1 %Y&lt;/m_strFormatTime&gt;&lt;m_yearfmt&gt;&lt;begin val=&quot;0&quot;/&gt;&lt;end val=&quot;0&quot;/&gt;&lt;/m_yearfmt&gt;&lt;/m_precDefaultDate&gt;&lt;m_precDefaultYear&gt;&lt;m_bNumberIsYear val=&quot;0&quot;/&gt;&lt;m_strFormatTime&gt;%Y&lt;/m_strFormatTime&gt;&lt;m_yearfmt&gt;&lt;begin val=&quot;0&quot;/&gt;&lt;end val=&quot;0&quot;/&gt;&lt;/m_yearfmt&gt;&lt;/m_precDefaultYear&gt;&lt;m_precDefaultQuarter&gt;&lt;m_bNumberIsYear val=&quot;0&quot;/&gt;&lt;m_strFormatTime&gt;Q%5&lt;/m_strFormatTime&gt;&lt;m_yearfmt&gt;&lt;begin val=&quot;0&quot;/&gt;&lt;end val=&quot;4&quot;/&gt;&lt;/m_yearfmt&gt;&lt;/m_precDefaultQuarter&gt;&lt;m_precDefaultMonth&gt;&lt;m_bNumberIsYear val=&quot;0&quot;/&gt;&lt;m_strFormatTime&gt;%1&lt;/m_strFormatTime&gt;&lt;m_yearfmt&gt;&lt;begin val=&quot;0&quot;/&gt;&lt;end val=&quot;4&quot;/&gt;&lt;/m_yearfmt&gt;&lt;/m_precDefaultMonth&gt;&lt;m_precDefaultWeek&gt;&lt;m_bNumberIsYear val=&quot;0&quot;/&gt;&lt;m_strFormatTime&gt;%4&lt;/m_strFormatTime&gt;&lt;m_yearfmt&gt;&lt;begin val=&quot;0&quot;/&gt;&lt;end val=&quot;4&quot;/&gt;&lt;/m_yearfmt&gt;&lt;/m_precDefaultWeek&gt;&lt;m_precDefaultDay&gt;&lt;m_bNumberIsYear val=&quot;0&quot;/&gt;&lt;m_strFormatTime&gt;%#d&lt;/m_strFormatTime&gt;&lt;m_yearfmt&gt;&lt;begin val=&quot;0&quot;/&gt;&lt;end val=&quot;4&quot;/&gt;&lt;/m_yearfmt&gt;&lt;/m_precDefaultDay&gt;&lt;m_mruColor&gt;&lt;m_vecMRU length=&quot;2&quot;&gt;&lt;elem m_fUsage=&quot;1.00000000000000000000E+000&quot;&gt;&lt;m_msothmcolidx val=&quot;0&quot;/&gt;&lt;m_rgb r=&quot;9D&quot; g=&quot;CA&quot; b=&quot;A5&quot;/&gt;&lt;m_nBrightness val=&quot;0&quot;/&gt;&lt;/elem&gt;&lt;elem m_fUsage=&quot;9.00000000000000020000E-001&quot;&gt;&lt;m_msothmcolidx val=&quot;0&quot;/&gt;&lt;m_rgb r=&quot;4A&quot; g=&quot;7C&quot; b=&quot;CE&quot;/&gt;&lt;m_nBrightness val=&quot;0&quot;/&gt;&lt;/elem&gt;&lt;/m_vecMRU&gt;&lt;/m_mruColor&gt;&lt;m_eweekdayFirstOfWeek val=&quot;2&quot;/&gt;&lt;m_eweekdayFirstOfWorkweek val=&quot;2&quot;/&gt;&lt;m_eweekdayFirstOfWeekend val=&quot;7&quot;/&gt;&lt;/CPresentation&gt;&lt;/root&gt;"/>
   <p:tag name="THINKCELLUNDODONOTDELETE" val="0"/>
-  <p:tag name="EE4P_STYLE_ID" val="0fbcd015-fbac-494c-bcad-77fcf24a62f5"/>
 </p:tagLst>
 </file>
 

</xml_diff>